<commit_message>
upload: new report, old one deleted
</commit_message>
<xml_diff>
--- a/reports/Gold-Challenge-Group5.pptx
+++ b/reports/Gold-Challenge-Group5.pptx
@@ -28,23 +28,24 @@
     <p:sldId id="273" r:id="rId23"/>
     <p:sldId id="274" r:id="rId24"/>
     <p:sldId id="275" r:id="rId25"/>
+    <p:sldId id="276" r:id="rId26"/>
   </p:sldIdLst>
   <p:sldSz cy="5143500" cx="9144000"/>
   <p:notesSz cx="6858000" cy="9144000"/>
   <p:embeddedFontLst>
     <p:embeddedFont>
       <p:font typeface="Economica"/>
-      <p:regular r:id="rId26"/>
-      <p:bold r:id="rId27"/>
-      <p:italic r:id="rId28"/>
-      <p:boldItalic r:id="rId29"/>
+      <p:regular r:id="rId27"/>
+      <p:bold r:id="rId28"/>
+      <p:italic r:id="rId29"/>
+      <p:boldItalic r:id="rId30"/>
     </p:embeddedFont>
     <p:embeddedFont>
       <p:font typeface="Open Sans"/>
-      <p:regular r:id="rId30"/>
-      <p:bold r:id="rId31"/>
-      <p:italic r:id="rId32"/>
-      <p:boldItalic r:id="rId33"/>
+      <p:regular r:id="rId31"/>
+      <p:bold r:id="rId32"/>
+      <p:italic r:id="rId33"/>
+      <p:boldItalic r:id="rId34"/>
     </p:embeddedFont>
   </p:embeddedFontLst>
   <p:defaultTextStyle>
@@ -1364,7 +1365,7 @@
   <p:cSld>
     <p:spTree>
       <p:nvGrpSpPr>
-        <p:cNvPr id="152" name="Shape 152"/>
+        <p:cNvPr id="151" name="Shape 151"/>
         <p:cNvGrpSpPr/>
         <p:nvPr/>
       </p:nvGrpSpPr>
@@ -1378,7 +1379,7 @@
       </p:grpSpPr>
       <p:sp>
         <p:nvSpPr>
-          <p:cNvPr id="153" name="Google Shape;153;g25c1f328565_0_16:notes"/>
+          <p:cNvPr id="152" name="Google Shape;152;g25c1f328565_0_16:notes"/>
           <p:cNvSpPr/>
           <p:nvPr>
             <p:ph idx="2" type="sldImg"/>
@@ -1413,7 +1414,7 @@
       </p:sp>
       <p:sp>
         <p:nvSpPr>
-          <p:cNvPr id="154" name="Google Shape;154;g25c1f328565_0_16:notes"/>
+          <p:cNvPr id="153" name="Google Shape;153;g25c1f328565_0_16:notes"/>
           <p:cNvSpPr txBox="1"/>
           <p:nvPr>
             <p:ph idx="1" type="body"/>
@@ -1468,7 +1469,7 @@
   <p:cSld>
     <p:spTree>
       <p:nvGrpSpPr>
-        <p:cNvPr id="162" name="Shape 162"/>
+        <p:cNvPr id="161" name="Shape 161"/>
         <p:cNvGrpSpPr/>
         <p:nvPr/>
       </p:nvGrpSpPr>
@@ -1482,7 +1483,7 @@
       </p:grpSpPr>
       <p:sp>
         <p:nvSpPr>
-          <p:cNvPr id="163" name="Google Shape;163;g25c1f328565_0_5:notes"/>
+          <p:cNvPr id="162" name="Google Shape;162;g25c1f328565_0_5:notes"/>
           <p:cNvSpPr/>
           <p:nvPr>
             <p:ph idx="2" type="sldImg"/>
@@ -1517,7 +1518,7 @@
       </p:sp>
       <p:sp>
         <p:nvSpPr>
-          <p:cNvPr id="164" name="Google Shape;164;g25c1f328565_0_5:notes"/>
+          <p:cNvPr id="163" name="Google Shape;163;g25c1f328565_0_5:notes"/>
           <p:cNvSpPr txBox="1"/>
           <p:nvPr>
             <p:ph idx="1" type="body"/>
@@ -1572,7 +1573,7 @@
   <p:cSld>
     <p:spTree>
       <p:nvGrpSpPr>
-        <p:cNvPr id="169" name="Shape 169"/>
+        <p:cNvPr id="168" name="Shape 168"/>
         <p:cNvGrpSpPr/>
         <p:nvPr/>
       </p:nvGrpSpPr>
@@ -1586,7 +1587,7 @@
       </p:grpSpPr>
       <p:sp>
         <p:nvSpPr>
-          <p:cNvPr id="170" name="Google Shape;170;g25c1f328565_0_10:notes"/>
+          <p:cNvPr id="169" name="Google Shape;169;g25c1f328565_0_10:notes"/>
           <p:cNvSpPr/>
           <p:nvPr>
             <p:ph idx="2" type="sldImg"/>
@@ -1621,7 +1622,7 @@
       </p:sp>
       <p:sp>
         <p:nvSpPr>
-          <p:cNvPr id="171" name="Google Shape;171;g25c1f328565_0_10:notes"/>
+          <p:cNvPr id="170" name="Google Shape;170;g25c1f328565_0_10:notes"/>
           <p:cNvSpPr txBox="1"/>
           <p:nvPr>
             <p:ph idx="1" type="body"/>
@@ -1676,7 +1677,7 @@
   <p:cSld>
     <p:spTree>
       <p:nvGrpSpPr>
-        <p:cNvPr id="177" name="Shape 177"/>
+        <p:cNvPr id="175" name="Shape 175"/>
         <p:cNvGrpSpPr/>
         <p:nvPr/>
       </p:nvGrpSpPr>
@@ -1690,7 +1691,7 @@
       </p:grpSpPr>
       <p:sp>
         <p:nvSpPr>
-          <p:cNvPr id="178" name="Google Shape;178;g25c55b1c9c4_0_19:notes"/>
+          <p:cNvPr id="176" name="Google Shape;176;g25c55b1c9c4_0_19:notes"/>
           <p:cNvSpPr/>
           <p:nvPr>
             <p:ph idx="2" type="sldImg"/>
@@ -1725,7 +1726,7 @@
       </p:sp>
       <p:sp>
         <p:nvSpPr>
-          <p:cNvPr id="179" name="Google Shape;179;g25c55b1c9c4_0_19:notes"/>
+          <p:cNvPr id="177" name="Google Shape;177;g25c55b1c9c4_0_19:notes"/>
           <p:cNvSpPr txBox="1"/>
           <p:nvPr>
             <p:ph idx="1" type="body"/>
@@ -1775,7 +1776,7 @@
   <p:cSld>
     <p:spTree>
       <p:nvGrpSpPr>
-        <p:cNvPr id="182" name="Shape 182"/>
+        <p:cNvPr id="180" name="Shape 180"/>
         <p:cNvGrpSpPr/>
         <p:nvPr/>
       </p:nvGrpSpPr>
@@ -1789,7 +1790,7 @@
       </p:grpSpPr>
       <p:sp>
         <p:nvSpPr>
-          <p:cNvPr id="183" name="Google Shape;183;g25c55b1c9c4_0_23:notes"/>
+          <p:cNvPr id="181" name="Google Shape;181;g25c55b1c9c4_0_39:notes"/>
           <p:cNvSpPr/>
           <p:nvPr>
             <p:ph idx="2" type="sldImg"/>
@@ -1824,7 +1825,7 @@
       </p:sp>
       <p:sp>
         <p:nvSpPr>
-          <p:cNvPr id="184" name="Google Shape;184;g25c55b1c9c4_0_23:notes"/>
+          <p:cNvPr id="182" name="Google Shape;182;g25c55b1c9c4_0_39:notes"/>
           <p:cNvSpPr txBox="1"/>
           <p:nvPr>
             <p:ph idx="1" type="body"/>
@@ -1993,7 +1994,7 @@
       </p:grpSpPr>
       <p:sp>
         <p:nvSpPr>
-          <p:cNvPr id="190" name="Google Shape;190;g25c55b1c9c4_0_39:notes"/>
+          <p:cNvPr id="190" name="Google Shape;190;g25c9199043f_0_6:notes"/>
           <p:cNvSpPr/>
           <p:nvPr>
             <p:ph idx="2" type="sldImg"/>
@@ -2028,7 +2029,111 @@
       </p:sp>
       <p:sp>
         <p:nvSpPr>
-          <p:cNvPr id="191" name="Google Shape;191;g25c55b1c9c4_0_39:notes"/>
+          <p:cNvPr id="191" name="Google Shape;191;g25c9199043f_0_6:notes"/>
+          <p:cNvSpPr txBox="1"/>
+          <p:nvPr>
+            <p:ph idx="1" type="body"/>
+          </p:nvPr>
+        </p:nvSpPr>
+        <p:spPr>
+          <a:xfrm>
+            <a:off x="685800" y="4343400"/>
+            <a:ext cx="5486400" cy="4114800"/>
+          </a:xfrm>
+          <a:prstGeom prst="rect">
+            <a:avLst/>
+          </a:prstGeom>
+        </p:spPr>
+        <p:txBody>
+          <a:bodyPr anchorCtr="0" anchor="t" bIns="91425" lIns="91425" spcFirstLastPara="1" rIns="91425" wrap="square" tIns="91425">
+            <a:noAutofit/>
+          </a:bodyPr>
+          <a:lstStyle/>
+          <a:p>
+            <a:pPr indent="0" lvl="0" marL="0" rtl="0" algn="l">
+              <a:spcBef>
+                <a:spcPts val="0"/>
+              </a:spcBef>
+              <a:spcAft>
+                <a:spcPts val="0"/>
+              </a:spcAft>
+              <a:buNone/>
+            </a:pPr>
+            <a:r>
+              <a:rPr lang="en">
+                <a:solidFill>
+                  <a:schemeClr val="dk1"/>
+                </a:solidFill>
+              </a:rPr>
+              <a:t>Latar Belakang - Sumber Data</a:t>
+            </a:r>
+            <a:endParaRPr/>
+          </a:p>
+        </p:txBody>
+      </p:sp>
+    </p:spTree>
+  </p:cSld>
+  <p:clrMapOvr>
+    <a:masterClrMapping/>
+  </p:clrMapOvr>
+</p:notes>
+</file>
+
+<file path=ppt/notesSlides/notesSlide21.xml><?xml version="1.0" encoding="utf-8"?>
+<p:notes xmlns:a="http://schemas.openxmlformats.org/drawingml/2006/main" xmlns:r="http://schemas.openxmlformats.org/officeDocument/2006/relationships" xmlns:mc="http://schemas.openxmlformats.org/markup-compatibility/2006" xmlns:mv="urn:schemas-microsoft-com:mac:vml" xmlns:p="http://schemas.openxmlformats.org/presentationml/2006/main" xmlns:c="http://schemas.openxmlformats.org/drawingml/2006/chart" xmlns:dgm="http://schemas.openxmlformats.org/drawingml/2006/diagram" xmlns:o="urn:schemas-microsoft-com:office:office" xmlns:v="urn:schemas-microsoft-com:vml" xmlns:pvml="urn:schemas-microsoft-com:office:powerpoint" xmlns:com="http://schemas.openxmlformats.org/drawingml/2006/compatibility" xmlns:p14="http://schemas.microsoft.com/office/powerpoint/2010/main" xmlns:p15="http://schemas.microsoft.com/office/powerpoint/2012/main" xmlns:ahyp="http://schemas.microsoft.com/office/drawing/2018/hyperlinkcolor" showMasterPhAnim="0" showMasterSp="0">
+  <p:cSld>
+    <p:spTree>
+      <p:nvGrpSpPr>
+        <p:cNvPr id="196" name="Shape 196"/>
+        <p:cNvGrpSpPr/>
+        <p:nvPr/>
+      </p:nvGrpSpPr>
+      <p:grpSpPr>
+        <a:xfrm>
+          <a:off x="0" y="0"/>
+          <a:ext cx="0" cy="0"/>
+          <a:chOff x="0" y="0"/>
+          <a:chExt cx="0" cy="0"/>
+        </a:xfrm>
+      </p:grpSpPr>
+      <p:sp>
+        <p:nvSpPr>
+          <p:cNvPr id="197" name="Google Shape;197;g25c55b1c9c4_0_23:notes"/>
+          <p:cNvSpPr/>
+          <p:nvPr>
+            <p:ph idx="2" type="sldImg"/>
+          </p:nvPr>
+        </p:nvSpPr>
+        <p:spPr>
+          <a:xfrm>
+            <a:off x="381300" y="685800"/>
+            <a:ext cx="6096000" cy="3429000"/>
+          </a:xfrm>
+          <a:custGeom>
+            <a:rect b="b" l="l" r="r" t="t"/>
+            <a:pathLst>
+              <a:path extrusionOk="0" h="120000" w="120000">
+                <a:moveTo>
+                  <a:pt x="0" y="0"/>
+                </a:moveTo>
+                <a:lnTo>
+                  <a:pt x="120000" y="0"/>
+                </a:lnTo>
+                <a:lnTo>
+                  <a:pt x="120000" y="120000"/>
+                </a:lnTo>
+                <a:lnTo>
+                  <a:pt x="0" y="120000"/>
+                </a:lnTo>
+                <a:close/>
+              </a:path>
+            </a:pathLst>
+          </a:custGeom>
+        </p:spPr>
+      </p:sp>
+      <p:sp>
+        <p:nvSpPr>
+          <p:cNvPr id="198" name="Google Shape;198;g25c55b1c9c4_0_23:notes"/>
           <p:cNvSpPr txBox="1"/>
           <p:nvPr>
             <p:ph idx="1" type="body"/>
@@ -9258,8 +9363,8 @@
         </p:blipFill>
         <p:spPr>
           <a:xfrm>
-            <a:off x="14900" y="823275"/>
-            <a:ext cx="4328500" cy="3144275"/>
+            <a:off x="4867700" y="757850"/>
+            <a:ext cx="4071750" cy="3275115"/>
           </a:xfrm>
           <a:prstGeom prst="rect">
             <a:avLst/>
@@ -9270,37 +9375,9 @@
           </a:ln>
         </p:spPr>
       </p:pic>
-      <p:pic>
-        <p:nvPicPr>
-          <p:cNvPr id="150" name="Google Shape;150;p26"/>
-          <p:cNvPicPr preferRelativeResize="0"/>
-          <p:nvPr/>
-        </p:nvPicPr>
-        <p:blipFill>
-          <a:blip r:embed="rId4">
-            <a:alphaModFix/>
-          </a:blip>
-          <a:stretch>
-            <a:fillRect/>
-          </a:stretch>
-        </p:blipFill>
-        <p:spPr>
-          <a:xfrm>
-            <a:off x="4867700" y="757850"/>
-            <a:ext cx="4071750" cy="3275115"/>
-          </a:xfrm>
-          <a:prstGeom prst="rect">
-            <a:avLst/>
-          </a:prstGeom>
-          <a:noFill/>
-          <a:ln>
-            <a:noFill/>
-          </a:ln>
-        </p:spPr>
-      </p:pic>
       <p:sp>
         <p:nvSpPr>
-          <p:cNvPr id="151" name="Google Shape;151;p26"/>
+          <p:cNvPr id="150" name="Google Shape;150;p26"/>
           <p:cNvSpPr/>
           <p:nvPr/>
         </p:nvSpPr>
@@ -9459,7 +9536,7 @@
   <p:cSld>
     <p:spTree>
       <p:nvGrpSpPr>
-        <p:cNvPr id="155" name="Shape 155"/>
+        <p:cNvPr id="154" name="Shape 154"/>
         <p:cNvGrpSpPr/>
         <p:nvPr/>
       </p:nvGrpSpPr>
@@ -9473,7 +9550,7 @@
       </p:grpSpPr>
       <p:sp>
         <p:nvSpPr>
-          <p:cNvPr id="156" name="Google Shape;156;p27"/>
+          <p:cNvPr id="155" name="Google Shape;155;p27"/>
           <p:cNvSpPr txBox="1"/>
           <p:nvPr>
             <p:ph type="title"/>
@@ -9513,7 +9590,7 @@
       </p:sp>
       <p:sp>
         <p:nvSpPr>
-          <p:cNvPr id="157" name="Google Shape;157;p27"/>
+          <p:cNvPr id="156" name="Google Shape;156;p27"/>
           <p:cNvSpPr txBox="1"/>
           <p:nvPr>
             <p:ph idx="1" type="body"/>
@@ -9604,7 +9681,7 @@
       </p:sp>
       <p:pic>
         <p:nvPicPr>
-          <p:cNvPr id="158" name="Google Shape;158;p27"/>
+          <p:cNvPr id="157" name="Google Shape;157;p27"/>
           <p:cNvPicPr preferRelativeResize="0"/>
           <p:nvPr/>
         </p:nvPicPr>
@@ -9632,7 +9709,7 @@
       </p:pic>
       <p:pic>
         <p:nvPicPr>
-          <p:cNvPr id="159" name="Google Shape;159;p27"/>
+          <p:cNvPr id="158" name="Google Shape;158;p27"/>
           <p:cNvPicPr preferRelativeResize="0"/>
           <p:nvPr/>
         </p:nvPicPr>
@@ -9660,7 +9737,7 @@
       </p:pic>
       <p:sp>
         <p:nvSpPr>
-          <p:cNvPr id="160" name="Google Shape;160;p27"/>
+          <p:cNvPr id="159" name="Google Shape;159;p27"/>
           <p:cNvSpPr txBox="1"/>
           <p:nvPr/>
         </p:nvSpPr>
@@ -9712,7 +9789,7 @@
       </p:sp>
       <p:sp>
         <p:nvSpPr>
-          <p:cNvPr id="161" name="Google Shape;161;p27"/>
+          <p:cNvPr id="160" name="Google Shape;160;p27"/>
           <p:cNvSpPr txBox="1"/>
           <p:nvPr/>
         </p:nvSpPr>
@@ -9775,7 +9852,7 @@
   <p:cSld>
     <p:spTree>
       <p:nvGrpSpPr>
-        <p:cNvPr id="165" name="Shape 165"/>
+        <p:cNvPr id="164" name="Shape 164"/>
         <p:cNvGrpSpPr/>
         <p:nvPr/>
       </p:nvGrpSpPr>
@@ -9789,7 +9866,7 @@
       </p:grpSpPr>
       <p:sp>
         <p:nvSpPr>
-          <p:cNvPr id="166" name="Google Shape;166;p28"/>
+          <p:cNvPr id="165" name="Google Shape;165;p28"/>
           <p:cNvSpPr txBox="1"/>
           <p:nvPr>
             <p:ph type="title"/>
@@ -9829,7 +9906,7 @@
       </p:sp>
       <p:sp>
         <p:nvSpPr>
-          <p:cNvPr id="167" name="Google Shape;167;p28"/>
+          <p:cNvPr id="166" name="Google Shape;166;p28"/>
           <p:cNvSpPr txBox="1"/>
           <p:nvPr>
             <p:ph idx="1" type="body"/>
@@ -9968,7 +10045,7 @@
       </p:sp>
       <p:pic>
         <p:nvPicPr>
-          <p:cNvPr id="168" name="Google Shape;168;p28"/>
+          <p:cNvPr id="167" name="Google Shape;167;p28"/>
           <p:cNvPicPr preferRelativeResize="0"/>
           <p:nvPr/>
         </p:nvPicPr>
@@ -10007,7 +10084,7 @@
   <p:cSld>
     <p:spTree>
       <p:nvGrpSpPr>
-        <p:cNvPr id="172" name="Shape 172"/>
+        <p:cNvPr id="171" name="Shape 171"/>
         <p:cNvGrpSpPr/>
         <p:nvPr/>
       </p:nvGrpSpPr>
@@ -10021,7 +10098,7 @@
       </p:grpSpPr>
       <p:sp>
         <p:nvSpPr>
-          <p:cNvPr id="173" name="Google Shape;173;p29"/>
+          <p:cNvPr id="172" name="Google Shape;172;p29"/>
           <p:cNvSpPr txBox="1"/>
           <p:nvPr>
             <p:ph type="title"/>
@@ -10061,7 +10138,7 @@
       </p:sp>
       <p:sp>
         <p:nvSpPr>
-          <p:cNvPr id="174" name="Google Shape;174;p29"/>
+          <p:cNvPr id="173" name="Google Shape;173;p29"/>
           <p:cNvSpPr txBox="1"/>
           <p:nvPr>
             <p:ph idx="1" type="body"/>
@@ -10161,40 +10238,12 @@
       </p:sp>
       <p:pic>
         <p:nvPicPr>
-          <p:cNvPr id="175" name="Google Shape;175;p29"/>
+          <p:cNvPr id="174" name="Google Shape;174;p29"/>
           <p:cNvPicPr preferRelativeResize="0"/>
           <p:nvPr/>
         </p:nvPicPr>
         <p:blipFill>
           <a:blip r:embed="rId3">
-            <a:alphaModFix/>
-          </a:blip>
-          <a:stretch>
-            <a:fillRect/>
-          </a:stretch>
-        </p:blipFill>
-        <p:spPr>
-          <a:xfrm>
-            <a:off x="3777021" y="3695671"/>
-            <a:ext cx="4795426" cy="1025250"/>
-          </a:xfrm>
-          <a:prstGeom prst="rect">
-            <a:avLst/>
-          </a:prstGeom>
-          <a:noFill/>
-          <a:ln>
-            <a:noFill/>
-          </a:ln>
-        </p:spPr>
-      </p:pic>
-      <p:pic>
-        <p:nvPicPr>
-          <p:cNvPr id="176" name="Google Shape;176;p29"/>
-          <p:cNvPicPr preferRelativeResize="0"/>
-          <p:nvPr/>
-        </p:nvPicPr>
-        <p:blipFill>
-          <a:blip r:embed="rId4">
             <a:alphaModFix/>
           </a:blip>
           <a:stretch>
@@ -10235,7 +10284,7 @@
     </p:bg>
     <p:spTree>
       <p:nvGrpSpPr>
-        <p:cNvPr id="180" name="Shape 180"/>
+        <p:cNvPr id="178" name="Shape 178"/>
         <p:cNvGrpSpPr/>
         <p:nvPr/>
       </p:nvGrpSpPr>
@@ -10249,7 +10298,7 @@
       </p:grpSpPr>
       <p:sp>
         <p:nvSpPr>
-          <p:cNvPr id="181" name="Google Shape;181;p30"/>
+          <p:cNvPr id="179" name="Google Shape;179;p30"/>
           <p:cNvSpPr txBox="1"/>
           <p:nvPr/>
         </p:nvSpPr>
@@ -10318,7 +10367,7 @@
   <p:cSld>
     <p:spTree>
       <p:nvGrpSpPr>
-        <p:cNvPr id="185" name="Shape 185"/>
+        <p:cNvPr id="183" name="Shape 183"/>
         <p:cNvGrpSpPr/>
         <p:nvPr/>
       </p:nvGrpSpPr>
@@ -10332,7 +10381,7 @@
       </p:grpSpPr>
       <p:sp>
         <p:nvSpPr>
-          <p:cNvPr id="186" name="Google Shape;186;p31"/>
+          <p:cNvPr id="184" name="Google Shape;184;p31"/>
           <p:cNvSpPr txBox="1"/>
           <p:nvPr>
             <p:ph type="title"/>
@@ -10364,7 +10413,7 @@
             </a:pPr>
             <a:r>
               <a:rPr lang="en"/>
-              <a:t>ayameRushia dan Abusive data</a:t>
+              <a:t>ayameRushia vs Abusive data</a:t>
             </a:r>
             <a:endParaRPr/>
           </a:p>
@@ -10372,7 +10421,7 @@
       </p:sp>
       <p:pic>
         <p:nvPicPr>
-          <p:cNvPr id="187" name="Google Shape;187;p31"/>
+          <p:cNvPr id="185" name="Google Shape;185;p31"/>
           <p:cNvPicPr preferRelativeResize="0"/>
           <p:nvPr/>
         </p:nvPicPr>
@@ -10386,8 +10435,8 @@
         </p:blipFill>
         <p:spPr>
           <a:xfrm>
-            <a:off x="5484075" y="1327700"/>
-            <a:ext cx="3348225" cy="3282575"/>
+            <a:off x="4572000" y="1147225"/>
+            <a:ext cx="3940554" cy="2905225"/>
           </a:xfrm>
           <a:prstGeom prst="rect">
             <a:avLst/>
@@ -10398,16 +10447,24 @@
           </a:ln>
         </p:spPr>
       </p:pic>
-      <p:sp>
-        <p:nvSpPr>
-          <p:cNvPr id="188" name="Google Shape;188;p31"/>
-          <p:cNvSpPr txBox="1"/>
+      <p:pic>
+        <p:nvPicPr>
+          <p:cNvPr id="186" name="Google Shape;186;p31"/>
+          <p:cNvPicPr preferRelativeResize="0"/>
           <p:nvPr/>
-        </p:nvSpPr>
-        <p:spPr>
-          <a:xfrm>
-            <a:off x="311700" y="1327700"/>
-            <a:ext cx="5082000" cy="3478200"/>
+        </p:nvPicPr>
+        <p:blipFill>
+          <a:blip r:embed="rId4">
+            <a:alphaModFix/>
+          </a:blip>
+          <a:stretch>
+            <a:fillRect/>
+          </a:stretch>
+        </p:blipFill>
+        <p:spPr>
+          <a:xfrm>
+            <a:off x="355850" y="1147225"/>
+            <a:ext cx="3611900" cy="2905225"/>
           </a:xfrm>
           <a:prstGeom prst="rect">
             <a:avLst/>
@@ -10417,13 +10474,33 @@
             <a:noFill/>
           </a:ln>
         </p:spPr>
+      </p:pic>
+      <p:sp>
+        <p:nvSpPr>
+          <p:cNvPr id="187" name="Google Shape;187;p31"/>
+          <p:cNvSpPr txBox="1"/>
+          <p:nvPr/>
+        </p:nvSpPr>
+        <p:spPr>
+          <a:xfrm>
+            <a:off x="1292250" y="3978625"/>
+            <a:ext cx="1739100" cy="418500"/>
+          </a:xfrm>
+          <a:prstGeom prst="rect">
+            <a:avLst/>
+          </a:prstGeom>
+          <a:noFill/>
+          <a:ln>
+            <a:noFill/>
+          </a:ln>
+        </p:spPr>
         <p:txBody>
           <a:bodyPr anchorCtr="0" anchor="t" bIns="91425" lIns="91425" spcFirstLastPara="1" rIns="91425" wrap="square" tIns="91425">
             <a:noAutofit/>
           </a:bodyPr>
           <a:lstStyle/>
           <a:p>
-            <a:pPr indent="0" lvl="0" marL="0" rtl="0" algn="l">
+            <a:pPr indent="0" lvl="0" marL="0" rtl="0" algn="ctr">
               <a:spcBef>
                 <a:spcPts val="0"/>
               </a:spcBef>
@@ -10433,23 +10510,49 @@
               <a:buNone/>
             </a:pPr>
             <a:r>
-              <a:rPr lang="en">
+              <a:rPr b="1" lang="en" sz="900">
                 <a:latin typeface="Open Sans"/>
                 <a:ea typeface="Open Sans"/>
                 <a:cs typeface="Open Sans"/>
                 <a:sym typeface="Open Sans"/>
               </a:rPr>
-              <a:t>Dari hasil penelitian kami, kami sudah menghitung secara kesimpulan. Bahwa dari data yang sudah kami analisis.</a:t>
-            </a:r>
-            <a:endParaRPr>
+              <a:t>ayameRushia</a:t>
+            </a:r>
+            <a:endParaRPr b="1" sz="900">
               <a:latin typeface="Open Sans"/>
               <a:ea typeface="Open Sans"/>
               <a:cs typeface="Open Sans"/>
               <a:sym typeface="Open Sans"/>
             </a:endParaRPr>
           </a:p>
-          <a:p>
-            <a:pPr indent="0" lvl="0" marL="0" rtl="0" algn="l">
+        </p:txBody>
+      </p:sp>
+      <p:sp>
+        <p:nvSpPr>
+          <p:cNvPr id="188" name="Google Shape;188;p31"/>
+          <p:cNvSpPr txBox="1"/>
+          <p:nvPr/>
+        </p:nvSpPr>
+        <p:spPr>
+          <a:xfrm>
+            <a:off x="5168125" y="3978625"/>
+            <a:ext cx="2830200" cy="607200"/>
+          </a:xfrm>
+          <a:prstGeom prst="rect">
+            <a:avLst/>
+          </a:prstGeom>
+          <a:noFill/>
+          <a:ln>
+            <a:noFill/>
+          </a:ln>
+        </p:spPr>
+        <p:txBody>
+          <a:bodyPr anchorCtr="0" anchor="t" bIns="91425" lIns="91425" spcFirstLastPara="1" rIns="91425" wrap="square" tIns="91425">
+            <a:noAutofit/>
+          </a:bodyPr>
+          <a:lstStyle/>
+          <a:p>
+            <a:pPr indent="0" lvl="0" marL="0" rtl="0" algn="ctr">
               <a:spcBef>
                 <a:spcPts val="0"/>
               </a:spcBef>
@@ -10459,277 +10562,7 @@
               <a:buNone/>
             </a:pPr>
             <a:r>
-              <a:t/>
-            </a:r>
-            <a:endParaRPr>
-              <a:latin typeface="Open Sans"/>
-              <a:ea typeface="Open Sans"/>
-              <a:cs typeface="Open Sans"/>
-              <a:sym typeface="Open Sans"/>
-            </a:endParaRPr>
-          </a:p>
-          <a:p>
-            <a:pPr indent="0" lvl="0" marL="0" rtl="0" algn="l">
-              <a:spcBef>
-                <a:spcPts val="0"/>
-              </a:spcBef>
-              <a:spcAft>
-                <a:spcPts val="0"/>
-              </a:spcAft>
-              <a:buNone/>
-            </a:pPr>
-            <a:r>
-              <a:rPr lang="en">
-                <a:latin typeface="Open Sans"/>
-                <a:ea typeface="Open Sans"/>
-                <a:cs typeface="Open Sans"/>
-                <a:sym typeface="Open Sans"/>
-              </a:rPr>
-              <a:t>Kami menghitung mana yang masuk kategori </a:t>
-            </a:r>
-            <a:r>
-              <a:rPr b="1" lang="en">
-                <a:latin typeface="Open Sans"/>
-                <a:ea typeface="Open Sans"/>
-                <a:cs typeface="Open Sans"/>
-                <a:sym typeface="Open Sans"/>
-              </a:rPr>
-              <a:t>Sentiment</a:t>
-            </a:r>
-            <a:r>
-              <a:rPr lang="en">
-                <a:latin typeface="Open Sans"/>
-                <a:ea typeface="Open Sans"/>
-                <a:cs typeface="Open Sans"/>
-                <a:sym typeface="Open Sans"/>
-              </a:rPr>
-              <a:t>:</a:t>
-            </a:r>
-            <a:endParaRPr>
-              <a:latin typeface="Open Sans"/>
-              <a:ea typeface="Open Sans"/>
-              <a:cs typeface="Open Sans"/>
-              <a:sym typeface="Open Sans"/>
-            </a:endParaRPr>
-          </a:p>
-          <a:p>
-            <a:pPr indent="0" lvl="0" marL="0" rtl="0" algn="l">
-              <a:spcBef>
-                <a:spcPts val="0"/>
-              </a:spcBef>
-              <a:spcAft>
-                <a:spcPts val="0"/>
-              </a:spcAft>
-              <a:buNone/>
-            </a:pPr>
-            <a:r>
-              <a:t/>
-            </a:r>
-            <a:endParaRPr>
-              <a:latin typeface="Open Sans"/>
-              <a:ea typeface="Open Sans"/>
-              <a:cs typeface="Open Sans"/>
-              <a:sym typeface="Open Sans"/>
-            </a:endParaRPr>
-          </a:p>
-          <a:p>
-            <a:pPr indent="-317500" lvl="0" marL="457200" rtl="0" algn="l">
-              <a:spcBef>
-                <a:spcPts val="0"/>
-              </a:spcBef>
-              <a:spcAft>
-                <a:spcPts val="0"/>
-              </a:spcAft>
-              <a:buSzPts val="1400"/>
-              <a:buFont typeface="Open Sans"/>
-              <a:buAutoNum type="arabicPeriod"/>
-            </a:pPr>
-            <a:r>
-              <a:rPr b="1" lang="en">
-                <a:latin typeface="Open Sans"/>
-                <a:ea typeface="Open Sans"/>
-                <a:cs typeface="Open Sans"/>
-                <a:sym typeface="Open Sans"/>
-              </a:rPr>
-              <a:t>Positive</a:t>
-            </a:r>
-            <a:r>
-              <a:rPr lang="en">
-                <a:latin typeface="Open Sans"/>
-                <a:ea typeface="Open Sans"/>
-                <a:cs typeface="Open Sans"/>
-                <a:sym typeface="Open Sans"/>
-              </a:rPr>
-              <a:t> dan </a:t>
-            </a:r>
-            <a:r>
-              <a:rPr b="1" lang="en">
-                <a:latin typeface="Open Sans"/>
-                <a:ea typeface="Open Sans"/>
-                <a:cs typeface="Open Sans"/>
-                <a:sym typeface="Open Sans"/>
-              </a:rPr>
-              <a:t>Neutral</a:t>
-            </a:r>
-            <a:r>
-              <a:rPr lang="en">
-                <a:latin typeface="Open Sans"/>
-                <a:ea typeface="Open Sans"/>
-                <a:cs typeface="Open Sans"/>
-                <a:sym typeface="Open Sans"/>
-              </a:rPr>
-              <a:t>, namun mengandung kata </a:t>
-            </a:r>
-            <a:r>
-              <a:rPr b="1" lang="en">
-                <a:latin typeface="Open Sans"/>
-                <a:ea typeface="Open Sans"/>
-                <a:cs typeface="Open Sans"/>
-                <a:sym typeface="Open Sans"/>
-              </a:rPr>
-              <a:t>Abusive.</a:t>
-            </a:r>
-            <a:endParaRPr>
-              <a:latin typeface="Open Sans"/>
-              <a:ea typeface="Open Sans"/>
-              <a:cs typeface="Open Sans"/>
-              <a:sym typeface="Open Sans"/>
-            </a:endParaRPr>
-          </a:p>
-          <a:p>
-            <a:pPr indent="-317500" lvl="0" marL="457200" rtl="0" algn="l">
-              <a:spcBef>
-                <a:spcPts val="0"/>
-              </a:spcBef>
-              <a:spcAft>
-                <a:spcPts val="0"/>
-              </a:spcAft>
-              <a:buSzPts val="1400"/>
-              <a:buFont typeface="Open Sans"/>
-              <a:buAutoNum type="arabicPeriod"/>
-            </a:pPr>
-            <a:r>
-              <a:rPr b="1" lang="en">
-                <a:latin typeface="Open Sans"/>
-                <a:ea typeface="Open Sans"/>
-                <a:cs typeface="Open Sans"/>
-                <a:sym typeface="Open Sans"/>
-              </a:rPr>
-              <a:t>Negative</a:t>
-            </a:r>
-            <a:r>
-              <a:rPr lang="en">
-                <a:latin typeface="Open Sans"/>
-                <a:ea typeface="Open Sans"/>
-                <a:cs typeface="Open Sans"/>
-                <a:sym typeface="Open Sans"/>
-              </a:rPr>
-              <a:t> namun tidak mengandung kata </a:t>
-            </a:r>
-            <a:r>
-              <a:rPr b="1" lang="en">
-                <a:latin typeface="Open Sans"/>
-                <a:ea typeface="Open Sans"/>
-                <a:cs typeface="Open Sans"/>
-                <a:sym typeface="Open Sans"/>
-              </a:rPr>
-              <a:t>Abusive</a:t>
-            </a:r>
-            <a:r>
-              <a:rPr lang="en">
-                <a:latin typeface="Open Sans"/>
-                <a:ea typeface="Open Sans"/>
-                <a:cs typeface="Open Sans"/>
-                <a:sym typeface="Open Sans"/>
-              </a:rPr>
-              <a:t> sama sekali.</a:t>
-            </a:r>
-            <a:endParaRPr>
-              <a:latin typeface="Open Sans"/>
-              <a:ea typeface="Open Sans"/>
-              <a:cs typeface="Open Sans"/>
-              <a:sym typeface="Open Sans"/>
-            </a:endParaRPr>
-          </a:p>
-          <a:p>
-            <a:pPr indent="0" lvl="0" marL="0" rtl="0" algn="l">
-              <a:spcBef>
-                <a:spcPts val="0"/>
-              </a:spcBef>
-              <a:spcAft>
-                <a:spcPts val="0"/>
-              </a:spcAft>
-              <a:buNone/>
-            </a:pPr>
-            <a:r>
-              <a:t/>
-            </a:r>
-            <a:endParaRPr>
-              <a:latin typeface="Open Sans"/>
-              <a:ea typeface="Open Sans"/>
-              <a:cs typeface="Open Sans"/>
-              <a:sym typeface="Open Sans"/>
-            </a:endParaRPr>
-          </a:p>
-          <a:p>
-            <a:pPr indent="0" lvl="0" marL="0" rtl="0" algn="l">
-              <a:spcBef>
-                <a:spcPts val="0"/>
-              </a:spcBef>
-              <a:spcAft>
-                <a:spcPts val="0"/>
-              </a:spcAft>
-              <a:buNone/>
-            </a:pPr>
-            <a:r>
-              <a:t/>
-            </a:r>
-            <a:endParaRPr>
-              <a:latin typeface="Open Sans"/>
-              <a:ea typeface="Open Sans"/>
-              <a:cs typeface="Open Sans"/>
-              <a:sym typeface="Open Sans"/>
-            </a:endParaRPr>
-          </a:p>
-          <a:p>
-            <a:pPr indent="0" lvl="0" marL="0" rtl="0" algn="l">
-              <a:spcBef>
-                <a:spcPts val="0"/>
-              </a:spcBef>
-              <a:spcAft>
-                <a:spcPts val="0"/>
-              </a:spcAft>
-              <a:buNone/>
-            </a:pPr>
-            <a:r>
-              <a:rPr lang="en">
-                <a:latin typeface="Open Sans"/>
-                <a:ea typeface="Open Sans"/>
-                <a:cs typeface="Open Sans"/>
-                <a:sym typeface="Open Sans"/>
-              </a:rPr>
-              <a:t>2 Elemen ini kita anggap statement tidak akurat. Dan akurasi ini kita nilai antara data yang klasifikasi oleh </a:t>
-            </a:r>
-            <a:r>
-              <a:rPr b="1" lang="en">
-                <a:latin typeface="Open Sans"/>
-                <a:ea typeface="Open Sans"/>
-                <a:cs typeface="Open Sans"/>
-                <a:sym typeface="Open Sans"/>
-              </a:rPr>
-              <a:t>ayameRushia </a:t>
-            </a:r>
-            <a:r>
-              <a:rPr lang="en">
-                <a:latin typeface="Open Sans"/>
-                <a:ea typeface="Open Sans"/>
-                <a:cs typeface="Open Sans"/>
-                <a:sym typeface="Open Sans"/>
-              </a:rPr>
-              <a:t>dan data yang diklasifikasikan </a:t>
-            </a:r>
-            <a:r>
-              <a:rPr b="1" lang="en">
+              <a:rPr b="1" lang="en" sz="900">
                 <a:latin typeface="Open Sans"/>
                 <a:ea typeface="Open Sans"/>
                 <a:cs typeface="Open Sans"/>
@@ -10737,16 +10570,7 @@
               </a:rPr>
               <a:t>Abusive.csv</a:t>
             </a:r>
-            <a:r>
-              <a:rPr lang="en">
-                <a:latin typeface="Open Sans"/>
-                <a:ea typeface="Open Sans"/>
-                <a:cs typeface="Open Sans"/>
-                <a:sym typeface="Open Sans"/>
-              </a:rPr>
-              <a:t>.</a:t>
-            </a:r>
-            <a:endParaRPr>
+            <a:endParaRPr b="1" sz="900">
               <a:latin typeface="Open Sans"/>
               <a:ea typeface="Open Sans"/>
               <a:cs typeface="Open Sans"/>
@@ -10944,7 +10768,7 @@
         </p:nvSpPr>
         <p:spPr>
           <a:xfrm>
-            <a:off x="311700" y="315925"/>
+            <a:off x="311700" y="397950"/>
             <a:ext cx="8520600" cy="831300"/>
           </a:xfrm>
           <a:prstGeom prst="rect">
@@ -10953,7 +10777,7 @@
         </p:spPr>
         <p:txBody>
           <a:bodyPr anchorCtr="0" anchor="b" bIns="91425" lIns="91425" spcFirstLastPara="1" rIns="91425" wrap="square" tIns="91425">
-            <a:normAutofit/>
+            <a:normAutofit fontScale="90000"/>
           </a:bodyPr>
           <a:lstStyle/>
           <a:p>
@@ -10968,7 +10792,23 @@
             </a:pPr>
             <a:r>
               <a:rPr lang="en"/>
-              <a:t>ayameRushia vs Abusive data</a:t>
+              <a:t>Distribusi Data:</a:t>
+            </a:r>
+            <a:endParaRPr/>
+          </a:p>
+          <a:p>
+            <a:pPr indent="0" lvl="0" marL="0" rtl="0" algn="ctr">
+              <a:spcBef>
+                <a:spcPts val="0"/>
+              </a:spcBef>
+              <a:spcAft>
+                <a:spcPts val="0"/>
+              </a:spcAft>
+              <a:buNone/>
+            </a:pPr>
+            <a:r>
+              <a:rPr lang="en"/>
+              <a:t>ayameRushia dan Abusive data</a:t>
             </a:r>
             <a:endParaRPr/>
           </a:p>
@@ -10990,8 +10830,8 @@
         </p:blipFill>
         <p:spPr>
           <a:xfrm>
-            <a:off x="4572000" y="1147225"/>
-            <a:ext cx="3940554" cy="2905225"/>
+            <a:off x="4454013" y="1229250"/>
+            <a:ext cx="4378279" cy="3609450"/>
           </a:xfrm>
           <a:prstGeom prst="rect">
             <a:avLst/>
@@ -11002,24 +10842,16 @@
           </a:ln>
         </p:spPr>
       </p:pic>
-      <p:pic>
-        <p:nvPicPr>
+      <p:sp>
+        <p:nvSpPr>
           <p:cNvPr id="195" name="Google Shape;195;p32"/>
-          <p:cNvPicPr preferRelativeResize="0"/>
+          <p:cNvSpPr txBox="1"/>
           <p:nvPr/>
-        </p:nvPicPr>
-        <p:blipFill>
-          <a:blip r:embed="rId4">
-            <a:alphaModFix/>
-          </a:blip>
-          <a:stretch>
-            <a:fillRect/>
-          </a:stretch>
-        </p:blipFill>
-        <p:spPr>
-          <a:xfrm>
-            <a:off x="355850" y="1147225"/>
-            <a:ext cx="3611900" cy="2905225"/>
+        </p:nvSpPr>
+        <p:spPr>
+          <a:xfrm>
+            <a:off x="311700" y="2348925"/>
+            <a:ext cx="3929400" cy="1370100"/>
           </a:xfrm>
           <a:prstGeom prst="rect">
             <a:avLst/>
@@ -11029,17 +10861,226 @@
             <a:noFill/>
           </a:ln>
         </p:spPr>
-      </p:pic>
+        <p:txBody>
+          <a:bodyPr anchorCtr="0" anchor="t" bIns="91425" lIns="91425" spcFirstLastPara="1" rIns="91425" wrap="square" tIns="91425">
+            <a:noAutofit/>
+          </a:bodyPr>
+          <a:lstStyle/>
+          <a:p>
+            <a:pPr indent="0" lvl="0" marL="0" rtl="0" algn="l">
+              <a:spcBef>
+                <a:spcPts val="0"/>
+              </a:spcBef>
+              <a:spcAft>
+                <a:spcPts val="0"/>
+              </a:spcAft>
+              <a:buNone/>
+            </a:pPr>
+            <a:r>
+              <a:rPr lang="en">
+                <a:latin typeface="Open Sans"/>
+                <a:ea typeface="Open Sans"/>
+                <a:cs typeface="Open Sans"/>
+                <a:sym typeface="Open Sans"/>
+              </a:rPr>
+              <a:t>Distribusi data yang dihasilkan berdasarkan penelitian ini, berdasarkan:</a:t>
+            </a:r>
+            <a:endParaRPr>
+              <a:latin typeface="Open Sans"/>
+              <a:ea typeface="Open Sans"/>
+              <a:cs typeface="Open Sans"/>
+              <a:sym typeface="Open Sans"/>
+            </a:endParaRPr>
+          </a:p>
+          <a:p>
+            <a:pPr indent="0" lvl="0" marL="0" rtl="0" algn="l">
+              <a:spcBef>
+                <a:spcPts val="0"/>
+              </a:spcBef>
+              <a:spcAft>
+                <a:spcPts val="0"/>
+              </a:spcAft>
+              <a:buNone/>
+            </a:pPr>
+            <a:r>
+              <a:t/>
+            </a:r>
+            <a:endParaRPr>
+              <a:latin typeface="Open Sans"/>
+              <a:ea typeface="Open Sans"/>
+              <a:cs typeface="Open Sans"/>
+              <a:sym typeface="Open Sans"/>
+            </a:endParaRPr>
+          </a:p>
+          <a:p>
+            <a:pPr indent="0" lvl="0" marL="0" rtl="0" algn="l">
+              <a:spcBef>
+                <a:spcPts val="0"/>
+              </a:spcBef>
+              <a:spcAft>
+                <a:spcPts val="0"/>
+              </a:spcAft>
+              <a:buNone/>
+            </a:pPr>
+            <a:r>
+              <a:rPr lang="en">
+                <a:latin typeface="Open Sans"/>
+                <a:ea typeface="Open Sans"/>
+                <a:cs typeface="Open Sans"/>
+                <a:sym typeface="Open Sans"/>
+              </a:rPr>
+              <a:t>Sentiment dari ayameRushia dan data-data yang mengandung kata kasar (</a:t>
+            </a:r>
+            <a:r>
+              <a:rPr b="1" lang="en">
+                <a:latin typeface="Open Sans"/>
+                <a:ea typeface="Open Sans"/>
+                <a:cs typeface="Open Sans"/>
+                <a:sym typeface="Open Sans"/>
+              </a:rPr>
+              <a:t>Abusive)</a:t>
+            </a:r>
+            <a:r>
+              <a:rPr lang="en">
+                <a:latin typeface="Open Sans"/>
+                <a:ea typeface="Open Sans"/>
+                <a:cs typeface="Open Sans"/>
+                <a:sym typeface="Open Sans"/>
+              </a:rPr>
+              <a:t>.</a:t>
+            </a:r>
+            <a:endParaRPr>
+              <a:latin typeface="Open Sans"/>
+              <a:ea typeface="Open Sans"/>
+              <a:cs typeface="Open Sans"/>
+              <a:sym typeface="Open Sans"/>
+            </a:endParaRPr>
+          </a:p>
+          <a:p>
+            <a:pPr indent="0" lvl="0" marL="0" rtl="0" algn="l">
+              <a:spcBef>
+                <a:spcPts val="0"/>
+              </a:spcBef>
+              <a:spcAft>
+                <a:spcPts val="0"/>
+              </a:spcAft>
+              <a:buNone/>
+            </a:pPr>
+            <a:r>
+              <a:t/>
+            </a:r>
+            <a:endParaRPr>
+              <a:latin typeface="Open Sans"/>
+              <a:ea typeface="Open Sans"/>
+              <a:cs typeface="Open Sans"/>
+              <a:sym typeface="Open Sans"/>
+            </a:endParaRPr>
+          </a:p>
+          <a:p>
+            <a:pPr indent="0" lvl="0" marL="0" rtl="0" algn="l">
+              <a:spcBef>
+                <a:spcPts val="0"/>
+              </a:spcBef>
+              <a:spcAft>
+                <a:spcPts val="0"/>
+              </a:spcAft>
+              <a:buNone/>
+            </a:pPr>
+            <a:r>
+              <a:t/>
+            </a:r>
+            <a:endParaRPr>
+              <a:latin typeface="Open Sans"/>
+              <a:ea typeface="Open Sans"/>
+              <a:cs typeface="Open Sans"/>
+              <a:sym typeface="Open Sans"/>
+            </a:endParaRPr>
+          </a:p>
+        </p:txBody>
+      </p:sp>
+    </p:spTree>
+  </p:cSld>
+  <p:clrMapOvr>
+    <a:masterClrMapping/>
+  </p:clrMapOvr>
+</p:sld>
+</file>
+
+<file path=ppt/slides/slide21.xml><?xml version="1.0" encoding="utf-8"?>
+<p:sld xmlns:a="http://schemas.openxmlformats.org/drawingml/2006/main" xmlns:r="http://schemas.openxmlformats.org/officeDocument/2006/relationships" xmlns:mc="http://schemas.openxmlformats.org/markup-compatibility/2006" xmlns:mv="urn:schemas-microsoft-com:mac:vml" xmlns:p="http://schemas.openxmlformats.org/presentationml/2006/main" xmlns:c="http://schemas.openxmlformats.org/drawingml/2006/chart" xmlns:dgm="http://schemas.openxmlformats.org/drawingml/2006/diagram" xmlns:o="urn:schemas-microsoft-com:office:office" xmlns:v="urn:schemas-microsoft-com:vml" xmlns:pvml="urn:schemas-microsoft-com:office:powerpoint" xmlns:com="http://schemas.openxmlformats.org/drawingml/2006/compatibility" xmlns:p14="http://schemas.microsoft.com/office/powerpoint/2010/main" xmlns:p15="http://schemas.microsoft.com/office/powerpoint/2012/main" xmlns:ahyp="http://schemas.microsoft.com/office/drawing/2018/hyperlinkcolor">
+  <p:cSld>
+    <p:spTree>
+      <p:nvGrpSpPr>
+        <p:cNvPr id="199" name="Shape 199"/>
+        <p:cNvGrpSpPr/>
+        <p:nvPr/>
+      </p:nvGrpSpPr>
+      <p:grpSpPr>
+        <a:xfrm>
+          <a:off x="0" y="0"/>
+          <a:ext cx="0" cy="0"/>
+          <a:chOff x="0" y="0"/>
+          <a:chExt cx="0" cy="0"/>
+        </a:xfrm>
+      </p:grpSpPr>
       <p:sp>
         <p:nvSpPr>
-          <p:cNvPr id="196" name="Google Shape;196;p32"/>
+          <p:cNvPr id="200" name="Google Shape;200;p33"/>
           <p:cNvSpPr txBox="1"/>
+          <p:nvPr>
+            <p:ph type="title"/>
+          </p:nvPr>
+        </p:nvSpPr>
+        <p:spPr>
+          <a:xfrm>
+            <a:off x="311700" y="315925"/>
+            <a:ext cx="8520600" cy="831300"/>
+          </a:xfrm>
+          <a:prstGeom prst="rect">
+            <a:avLst/>
+          </a:prstGeom>
+        </p:spPr>
+        <p:txBody>
+          <a:bodyPr anchorCtr="0" anchor="b" bIns="91425" lIns="91425" spcFirstLastPara="1" rIns="91425" wrap="square" tIns="91425">
+            <a:normAutofit/>
+          </a:bodyPr>
+          <a:lstStyle/>
+          <a:p>
+            <a:pPr indent="0" lvl="0" marL="0" rtl="0" algn="ctr">
+              <a:spcBef>
+                <a:spcPts val="0"/>
+              </a:spcBef>
+              <a:spcAft>
+                <a:spcPts val="0"/>
+              </a:spcAft>
+              <a:buNone/>
+            </a:pPr>
+            <a:r>
+              <a:rPr lang="en"/>
+              <a:t>ayameRushia dan Abusive data</a:t>
+            </a:r>
+            <a:endParaRPr/>
+          </a:p>
+        </p:txBody>
+      </p:sp>
+      <p:pic>
+        <p:nvPicPr>
+          <p:cNvPr id="201" name="Google Shape;201;p33"/>
+          <p:cNvPicPr preferRelativeResize="0"/>
           <p:nvPr/>
-        </p:nvSpPr>
-        <p:spPr>
-          <a:xfrm>
-            <a:off x="1292250" y="3978625"/>
-            <a:ext cx="1739100" cy="418500"/>
+        </p:nvPicPr>
+        <p:blipFill>
+          <a:blip r:embed="rId3">
+            <a:alphaModFix/>
+          </a:blip>
+          <a:stretch>
+            <a:fillRect/>
+          </a:stretch>
+        </p:blipFill>
+        <p:spPr>
+          <a:xfrm>
+            <a:off x="5484075" y="1327700"/>
+            <a:ext cx="3348225" cy="3282575"/>
           </a:xfrm>
           <a:prstGeom prst="rect">
             <a:avLst/>
@@ -11049,49 +11090,17 @@
             <a:noFill/>
           </a:ln>
         </p:spPr>
-        <p:txBody>
-          <a:bodyPr anchorCtr="0" anchor="t" bIns="91425" lIns="91425" spcFirstLastPara="1" rIns="91425" wrap="square" tIns="91425">
-            <a:noAutofit/>
-          </a:bodyPr>
-          <a:lstStyle/>
-          <a:p>
-            <a:pPr indent="0" lvl="0" marL="0" rtl="0" algn="ctr">
-              <a:spcBef>
-                <a:spcPts val="0"/>
-              </a:spcBef>
-              <a:spcAft>
-                <a:spcPts val="0"/>
-              </a:spcAft>
-              <a:buNone/>
-            </a:pPr>
-            <a:r>
-              <a:rPr b="1" lang="en" sz="900">
-                <a:latin typeface="Open Sans"/>
-                <a:ea typeface="Open Sans"/>
-                <a:cs typeface="Open Sans"/>
-                <a:sym typeface="Open Sans"/>
-              </a:rPr>
-              <a:t>ayameRushia</a:t>
-            </a:r>
-            <a:endParaRPr b="1" sz="900">
-              <a:latin typeface="Open Sans"/>
-              <a:ea typeface="Open Sans"/>
-              <a:cs typeface="Open Sans"/>
-              <a:sym typeface="Open Sans"/>
-            </a:endParaRPr>
-          </a:p>
-        </p:txBody>
-      </p:sp>
+      </p:pic>
       <p:sp>
         <p:nvSpPr>
-          <p:cNvPr id="197" name="Google Shape;197;p32"/>
+          <p:cNvPr id="202" name="Google Shape;202;p33"/>
           <p:cNvSpPr txBox="1"/>
           <p:nvPr/>
         </p:nvSpPr>
         <p:spPr>
           <a:xfrm>
-            <a:off x="5168125" y="3978625"/>
-            <a:ext cx="2830200" cy="607200"/>
+            <a:off x="311700" y="1327700"/>
+            <a:ext cx="5082000" cy="3478200"/>
           </a:xfrm>
           <a:prstGeom prst="rect">
             <a:avLst/>
@@ -11107,7 +11116,7 @@
           </a:bodyPr>
           <a:lstStyle/>
           <a:p>
-            <a:pPr indent="0" lvl="0" marL="0" rtl="0" algn="ctr">
+            <a:pPr indent="0" lvl="0" marL="0" rtl="0" algn="l">
               <a:spcBef>
                 <a:spcPts val="0"/>
               </a:spcBef>
@@ -11117,7 +11126,303 @@
               <a:buNone/>
             </a:pPr>
             <a:r>
-              <a:rPr b="1" lang="en" sz="900">
+              <a:rPr lang="en">
+                <a:latin typeface="Open Sans"/>
+                <a:ea typeface="Open Sans"/>
+                <a:cs typeface="Open Sans"/>
+                <a:sym typeface="Open Sans"/>
+              </a:rPr>
+              <a:t>Dari hasil penelitian kami, kami sudah menghitung secara kesimpulan. Bahwa dari data yang sudah kami analisis.</a:t>
+            </a:r>
+            <a:endParaRPr>
+              <a:latin typeface="Open Sans"/>
+              <a:ea typeface="Open Sans"/>
+              <a:cs typeface="Open Sans"/>
+              <a:sym typeface="Open Sans"/>
+            </a:endParaRPr>
+          </a:p>
+          <a:p>
+            <a:pPr indent="0" lvl="0" marL="0" rtl="0" algn="l">
+              <a:spcBef>
+                <a:spcPts val="0"/>
+              </a:spcBef>
+              <a:spcAft>
+                <a:spcPts val="0"/>
+              </a:spcAft>
+              <a:buNone/>
+            </a:pPr>
+            <a:r>
+              <a:t/>
+            </a:r>
+            <a:endParaRPr>
+              <a:latin typeface="Open Sans"/>
+              <a:ea typeface="Open Sans"/>
+              <a:cs typeface="Open Sans"/>
+              <a:sym typeface="Open Sans"/>
+            </a:endParaRPr>
+          </a:p>
+          <a:p>
+            <a:pPr indent="0" lvl="0" marL="0" rtl="0" algn="l">
+              <a:spcBef>
+                <a:spcPts val="0"/>
+              </a:spcBef>
+              <a:spcAft>
+                <a:spcPts val="0"/>
+              </a:spcAft>
+              <a:buNone/>
+            </a:pPr>
+            <a:r>
+              <a:rPr lang="en">
+                <a:latin typeface="Open Sans"/>
+                <a:ea typeface="Open Sans"/>
+                <a:cs typeface="Open Sans"/>
+                <a:sym typeface="Open Sans"/>
+              </a:rPr>
+              <a:t>Kami menghitung mana yang masuk kategori </a:t>
+            </a:r>
+            <a:r>
+              <a:rPr b="1" lang="en">
+                <a:latin typeface="Open Sans"/>
+                <a:ea typeface="Open Sans"/>
+                <a:cs typeface="Open Sans"/>
+                <a:sym typeface="Open Sans"/>
+              </a:rPr>
+              <a:t>Sentiment</a:t>
+            </a:r>
+            <a:r>
+              <a:rPr lang="en">
+                <a:latin typeface="Open Sans"/>
+                <a:ea typeface="Open Sans"/>
+                <a:cs typeface="Open Sans"/>
+                <a:sym typeface="Open Sans"/>
+              </a:rPr>
+              <a:t>:</a:t>
+            </a:r>
+            <a:endParaRPr>
+              <a:latin typeface="Open Sans"/>
+              <a:ea typeface="Open Sans"/>
+              <a:cs typeface="Open Sans"/>
+              <a:sym typeface="Open Sans"/>
+            </a:endParaRPr>
+          </a:p>
+          <a:p>
+            <a:pPr indent="0" lvl="0" marL="0" rtl="0" algn="l">
+              <a:spcBef>
+                <a:spcPts val="0"/>
+              </a:spcBef>
+              <a:spcAft>
+                <a:spcPts val="0"/>
+              </a:spcAft>
+              <a:buNone/>
+            </a:pPr>
+            <a:r>
+              <a:t/>
+            </a:r>
+            <a:endParaRPr>
+              <a:latin typeface="Open Sans"/>
+              <a:ea typeface="Open Sans"/>
+              <a:cs typeface="Open Sans"/>
+              <a:sym typeface="Open Sans"/>
+            </a:endParaRPr>
+          </a:p>
+          <a:p>
+            <a:pPr indent="-317500" lvl="0" marL="457200" rtl="0" algn="l">
+              <a:spcBef>
+                <a:spcPts val="0"/>
+              </a:spcBef>
+              <a:spcAft>
+                <a:spcPts val="0"/>
+              </a:spcAft>
+              <a:buSzPts val="1400"/>
+              <a:buFont typeface="Open Sans"/>
+              <a:buAutoNum type="arabicPeriod"/>
+            </a:pPr>
+            <a:r>
+              <a:rPr b="1" lang="en">
+                <a:latin typeface="Open Sans"/>
+                <a:ea typeface="Open Sans"/>
+                <a:cs typeface="Open Sans"/>
+                <a:sym typeface="Open Sans"/>
+              </a:rPr>
+              <a:t>Positive</a:t>
+            </a:r>
+            <a:r>
+              <a:rPr lang="en">
+                <a:latin typeface="Open Sans"/>
+                <a:ea typeface="Open Sans"/>
+                <a:cs typeface="Open Sans"/>
+                <a:sym typeface="Open Sans"/>
+              </a:rPr>
+              <a:t> dan </a:t>
+            </a:r>
+            <a:r>
+              <a:rPr b="1" lang="en">
+                <a:latin typeface="Open Sans"/>
+                <a:ea typeface="Open Sans"/>
+                <a:cs typeface="Open Sans"/>
+                <a:sym typeface="Open Sans"/>
+              </a:rPr>
+              <a:t>Neutral</a:t>
+            </a:r>
+            <a:r>
+              <a:rPr lang="en">
+                <a:latin typeface="Open Sans"/>
+                <a:ea typeface="Open Sans"/>
+                <a:cs typeface="Open Sans"/>
+                <a:sym typeface="Open Sans"/>
+              </a:rPr>
+              <a:t>, namun mengandung kata </a:t>
+            </a:r>
+            <a:r>
+              <a:rPr b="1" lang="en">
+                <a:latin typeface="Open Sans"/>
+                <a:ea typeface="Open Sans"/>
+                <a:cs typeface="Open Sans"/>
+                <a:sym typeface="Open Sans"/>
+              </a:rPr>
+              <a:t>Abusive.</a:t>
+            </a:r>
+            <a:endParaRPr>
+              <a:latin typeface="Open Sans"/>
+              <a:ea typeface="Open Sans"/>
+              <a:cs typeface="Open Sans"/>
+              <a:sym typeface="Open Sans"/>
+            </a:endParaRPr>
+          </a:p>
+          <a:p>
+            <a:pPr indent="-317500" lvl="0" marL="457200" rtl="0" algn="l">
+              <a:spcBef>
+                <a:spcPts val="0"/>
+              </a:spcBef>
+              <a:spcAft>
+                <a:spcPts val="0"/>
+              </a:spcAft>
+              <a:buSzPts val="1400"/>
+              <a:buFont typeface="Open Sans"/>
+              <a:buAutoNum type="arabicPeriod"/>
+            </a:pPr>
+            <a:r>
+              <a:rPr b="1" lang="en">
+                <a:latin typeface="Open Sans"/>
+                <a:ea typeface="Open Sans"/>
+                <a:cs typeface="Open Sans"/>
+                <a:sym typeface="Open Sans"/>
+              </a:rPr>
+              <a:t>Negative</a:t>
+            </a:r>
+            <a:r>
+              <a:rPr lang="en">
+                <a:latin typeface="Open Sans"/>
+                <a:ea typeface="Open Sans"/>
+                <a:cs typeface="Open Sans"/>
+                <a:sym typeface="Open Sans"/>
+              </a:rPr>
+              <a:t> namun tidak mengandung kata </a:t>
+            </a:r>
+            <a:r>
+              <a:rPr b="1" lang="en">
+                <a:latin typeface="Open Sans"/>
+                <a:ea typeface="Open Sans"/>
+                <a:cs typeface="Open Sans"/>
+                <a:sym typeface="Open Sans"/>
+              </a:rPr>
+              <a:t>Abusive</a:t>
+            </a:r>
+            <a:r>
+              <a:rPr lang="en">
+                <a:latin typeface="Open Sans"/>
+                <a:ea typeface="Open Sans"/>
+                <a:cs typeface="Open Sans"/>
+                <a:sym typeface="Open Sans"/>
+              </a:rPr>
+              <a:t> sama sekali.</a:t>
+            </a:r>
+            <a:endParaRPr>
+              <a:latin typeface="Open Sans"/>
+              <a:ea typeface="Open Sans"/>
+              <a:cs typeface="Open Sans"/>
+              <a:sym typeface="Open Sans"/>
+            </a:endParaRPr>
+          </a:p>
+          <a:p>
+            <a:pPr indent="0" lvl="0" marL="0" rtl="0" algn="l">
+              <a:spcBef>
+                <a:spcPts val="0"/>
+              </a:spcBef>
+              <a:spcAft>
+                <a:spcPts val="0"/>
+              </a:spcAft>
+              <a:buNone/>
+            </a:pPr>
+            <a:r>
+              <a:t/>
+            </a:r>
+            <a:endParaRPr>
+              <a:latin typeface="Open Sans"/>
+              <a:ea typeface="Open Sans"/>
+              <a:cs typeface="Open Sans"/>
+              <a:sym typeface="Open Sans"/>
+            </a:endParaRPr>
+          </a:p>
+          <a:p>
+            <a:pPr indent="0" lvl="0" marL="0" rtl="0" algn="l">
+              <a:spcBef>
+                <a:spcPts val="0"/>
+              </a:spcBef>
+              <a:spcAft>
+                <a:spcPts val="0"/>
+              </a:spcAft>
+              <a:buNone/>
+            </a:pPr>
+            <a:r>
+              <a:t/>
+            </a:r>
+            <a:endParaRPr>
+              <a:latin typeface="Open Sans"/>
+              <a:ea typeface="Open Sans"/>
+              <a:cs typeface="Open Sans"/>
+              <a:sym typeface="Open Sans"/>
+            </a:endParaRPr>
+          </a:p>
+          <a:p>
+            <a:pPr indent="0" lvl="0" marL="0" rtl="0" algn="l">
+              <a:spcBef>
+                <a:spcPts val="0"/>
+              </a:spcBef>
+              <a:spcAft>
+                <a:spcPts val="0"/>
+              </a:spcAft>
+              <a:buNone/>
+            </a:pPr>
+            <a:r>
+              <a:rPr lang="en">
+                <a:latin typeface="Open Sans"/>
+                <a:ea typeface="Open Sans"/>
+                <a:cs typeface="Open Sans"/>
+                <a:sym typeface="Open Sans"/>
+              </a:rPr>
+              <a:t>2 Elemen ini kita anggap statement tidak akurat. Dan akurasi ini kita nilai antara data yang klasifikasi oleh </a:t>
+            </a:r>
+            <a:r>
+              <a:rPr b="1" lang="en">
+                <a:latin typeface="Open Sans"/>
+                <a:ea typeface="Open Sans"/>
+                <a:cs typeface="Open Sans"/>
+                <a:sym typeface="Open Sans"/>
+              </a:rPr>
+              <a:t>ayameRushia </a:t>
+            </a:r>
+            <a:r>
+              <a:rPr lang="en">
+                <a:latin typeface="Open Sans"/>
+                <a:ea typeface="Open Sans"/>
+                <a:cs typeface="Open Sans"/>
+                <a:sym typeface="Open Sans"/>
+              </a:rPr>
+              <a:t>dan data yang diklasifikasikan </a:t>
+            </a:r>
+            <a:r>
+              <a:rPr b="1" lang="en">
                 <a:latin typeface="Open Sans"/>
                 <a:ea typeface="Open Sans"/>
                 <a:cs typeface="Open Sans"/>
@@ -11125,7 +11430,16 @@
               </a:rPr>
               <a:t>Abusive.csv</a:t>
             </a:r>
-            <a:endParaRPr b="1" sz="900">
+            <a:r>
+              <a:rPr lang="en">
+                <a:latin typeface="Open Sans"/>
+                <a:ea typeface="Open Sans"/>
+                <a:cs typeface="Open Sans"/>
+                <a:sym typeface="Open Sans"/>
+              </a:rPr>
+              <a:t>.</a:t>
+            </a:r>
+            <a:endParaRPr>
               <a:latin typeface="Open Sans"/>
               <a:ea typeface="Open Sans"/>
               <a:cs typeface="Open Sans"/>
@@ -12442,6 +12756,285 @@
 </file>
 
 <file path=ppt/theme/theme1.xml><?xml version="1.0" encoding="utf-8"?>
+<a:theme xmlns:a="http://schemas.openxmlformats.org/drawingml/2006/main" xmlns:r="http://schemas.openxmlformats.org/officeDocument/2006/relationships" name="Luxe">
+  <a:themeElements>
+    <a:clrScheme name="Luxe">
+      <a:dk1>
+        <a:srgbClr val="000000"/>
+      </a:dk1>
+      <a:lt1>
+        <a:srgbClr val="FFFFFF"/>
+      </a:lt1>
+      <a:dk2>
+        <a:srgbClr val="B7B7B7"/>
+      </a:dk2>
+      <a:lt2>
+        <a:srgbClr val="CCA677"/>
+      </a:lt2>
+      <a:accent1>
+        <a:srgbClr val="5D4037"/>
+      </a:accent1>
+      <a:accent2>
+        <a:srgbClr val="455A64"/>
+      </a:accent2>
+      <a:accent3>
+        <a:srgbClr val="57BB8A"/>
+      </a:accent3>
+      <a:accent4>
+        <a:srgbClr val="78909C"/>
+      </a:accent4>
+      <a:accent5>
+        <a:srgbClr val="607D8B"/>
+      </a:accent5>
+      <a:accent6>
+        <a:srgbClr val="DCE755"/>
+      </a:accent6>
+      <a:hlink>
+        <a:srgbClr val="607D8B"/>
+      </a:hlink>
+      <a:folHlink>
+        <a:srgbClr val="607D8B"/>
+      </a:folHlink>
+    </a:clrScheme>
+    <a:fontScheme name="Office">
+      <a:majorFont>
+        <a:latin typeface="Arial"/>
+        <a:ea typeface=""/>
+        <a:cs typeface=""/>
+        <a:font script="Jpan" typeface="ＭＳ Ｐゴシック"/>
+        <a:font script="Hang" typeface="맑은 고딕"/>
+        <a:font script="Hans" typeface="宋体"/>
+        <a:font script="Hant" typeface="新細明體"/>
+        <a:font script="Arab" typeface="Times New Roman"/>
+        <a:font script="Hebr" typeface="Times New Roman"/>
+        <a:font script="Thai" typeface="Angsana New"/>
+        <a:font script="Ethi" typeface="Nyala"/>
+        <a:font script="Beng" typeface="Vrinda"/>
+        <a:font script="Gujr" typeface="Shruti"/>
+        <a:font script="Khmr" typeface="MoolBoran"/>
+        <a:font script="Knda" typeface="Tunga"/>
+        <a:font script="Guru" typeface="Raavi"/>
+        <a:font script="Cans" typeface="Euphemia"/>
+        <a:font script="Cher" typeface="Plantagenet Cherokee"/>
+        <a:font script="Yiii" typeface="Microsoft Yi Baiti"/>
+        <a:font script="Tibt" typeface="Microsoft Himalaya"/>
+        <a:font script="Thaa" typeface="MV Boli"/>
+        <a:font script="Deva" typeface="Mangal"/>
+        <a:font script="Telu" typeface="Gautami"/>
+        <a:font script="Taml" typeface="Latha"/>
+        <a:font script="Syrc" typeface="Estrangelo Edessa"/>
+        <a:font script="Orya" typeface="Kalinga"/>
+        <a:font script="Mlym" typeface="Kartika"/>
+        <a:font script="Laoo" typeface="DokChampa"/>
+        <a:font script="Sinh" typeface="Iskoola Pota"/>
+        <a:font script="Mong" typeface="Mongolian Baiti"/>
+        <a:font script="Viet" typeface="Times New Roman"/>
+        <a:font script="Uigh" typeface="Microsoft Uighur"/>
+        <a:font script="Geor" typeface="Sylfaen"/>
+      </a:majorFont>
+      <a:minorFont>
+        <a:latin typeface="Arial"/>
+        <a:ea typeface=""/>
+        <a:cs typeface=""/>
+        <a:font script="Jpan" typeface="ＭＳ Ｐゴシック"/>
+        <a:font script="Hang" typeface="맑은 고딕"/>
+        <a:font script="Hans" typeface="宋体"/>
+        <a:font script="Hant" typeface="新細明體"/>
+        <a:font script="Arab" typeface="Arial"/>
+        <a:font script="Hebr" typeface="Arial"/>
+        <a:font script="Thai" typeface="Cordia New"/>
+        <a:font script="Ethi" typeface="Nyala"/>
+        <a:font script="Beng" typeface="Vrinda"/>
+        <a:font script="Gujr" typeface="Shruti"/>
+        <a:font script="Khmr" typeface="DaunPenh"/>
+        <a:font script="Knda" typeface="Tunga"/>
+        <a:font script="Guru" typeface="Raavi"/>
+        <a:font script="Cans" typeface="Euphemia"/>
+        <a:font script="Cher" typeface="Plantagenet Cherokee"/>
+        <a:font script="Yiii" typeface="Microsoft Yi Baiti"/>
+        <a:font script="Tibt" typeface="Microsoft Himalaya"/>
+        <a:font script="Thaa" typeface="MV Boli"/>
+        <a:font script="Deva" typeface="Mangal"/>
+        <a:font script="Telu" typeface="Gautami"/>
+        <a:font script="Taml" typeface="Latha"/>
+        <a:font script="Syrc" typeface="Estrangelo Edessa"/>
+        <a:font script="Orya" typeface="Kalinga"/>
+        <a:font script="Mlym" typeface="Kartika"/>
+        <a:font script="Laoo" typeface="DokChampa"/>
+        <a:font script="Sinh" typeface="Iskoola Pota"/>
+        <a:font script="Mong" typeface="Mongolian Baiti"/>
+        <a:font script="Viet" typeface="Arial"/>
+        <a:font script="Uigh" typeface="Microsoft Uighur"/>
+        <a:font script="Geor" typeface="Sylfaen"/>
+      </a:minorFont>
+    </a:fontScheme>
+    <a:fmtScheme name="Office">
+      <a:fillStyleLst>
+        <a:solidFill>
+          <a:schemeClr val="phClr"/>
+        </a:solidFill>
+        <a:gradFill rotWithShape="1">
+          <a:gsLst>
+            <a:gs pos="0">
+              <a:schemeClr val="phClr">
+                <a:tint val="50000"/>
+                <a:satMod val="300000"/>
+              </a:schemeClr>
+            </a:gs>
+            <a:gs pos="35000">
+              <a:schemeClr val="phClr">
+                <a:tint val="37000"/>
+                <a:satMod val="300000"/>
+              </a:schemeClr>
+            </a:gs>
+            <a:gs pos="100000">
+              <a:schemeClr val="phClr">
+                <a:tint val="15000"/>
+                <a:satMod val="350000"/>
+              </a:schemeClr>
+            </a:gs>
+          </a:gsLst>
+          <a:lin ang="16200000" scaled="1"/>
+        </a:gradFill>
+        <a:gradFill rotWithShape="1">
+          <a:gsLst>
+            <a:gs pos="0">
+              <a:schemeClr val="phClr">
+                <a:tint val="100000"/>
+                <a:shade val="100000"/>
+                <a:satMod val="130000"/>
+              </a:schemeClr>
+            </a:gs>
+            <a:gs pos="100000">
+              <a:schemeClr val="phClr">
+                <a:tint val="50000"/>
+                <a:shade val="100000"/>
+                <a:satMod val="350000"/>
+              </a:schemeClr>
+            </a:gs>
+          </a:gsLst>
+          <a:lin ang="16200000" scaled="0"/>
+        </a:gradFill>
+      </a:fillStyleLst>
+      <a:lnStyleLst>
+        <a:ln w="9525" cap="flat" cmpd="sng" algn="ctr">
+          <a:solidFill>
+            <a:schemeClr val="phClr">
+              <a:shade val="95000"/>
+              <a:satMod val="105000"/>
+            </a:schemeClr>
+          </a:solidFill>
+          <a:prstDash val="solid"/>
+        </a:ln>
+        <a:ln w="25400" cap="flat" cmpd="sng" algn="ctr">
+          <a:solidFill>
+            <a:schemeClr val="phClr"/>
+          </a:solidFill>
+          <a:prstDash val="solid"/>
+        </a:ln>
+        <a:ln w="38100" cap="flat" cmpd="sng" algn="ctr">
+          <a:solidFill>
+            <a:schemeClr val="phClr"/>
+          </a:solidFill>
+          <a:prstDash val="solid"/>
+        </a:ln>
+      </a:lnStyleLst>
+      <a:effectStyleLst>
+        <a:effectStyle>
+          <a:effectLst>
+            <a:outerShdw blurRad="40000" dist="20000" dir="5400000" rotWithShape="0">
+              <a:srgbClr val="000000">
+                <a:alpha val="38000"/>
+              </a:srgbClr>
+            </a:outerShdw>
+          </a:effectLst>
+        </a:effectStyle>
+        <a:effectStyle>
+          <a:effectLst>
+            <a:outerShdw blurRad="40000" dist="23000" dir="5400000" rotWithShape="0">
+              <a:srgbClr val="000000">
+                <a:alpha val="35000"/>
+              </a:srgbClr>
+            </a:outerShdw>
+          </a:effectLst>
+        </a:effectStyle>
+        <a:effectStyle>
+          <a:effectLst>
+            <a:outerShdw blurRad="40000" dist="23000" dir="5400000" rotWithShape="0">
+              <a:srgbClr val="000000">
+                <a:alpha val="35000"/>
+              </a:srgbClr>
+            </a:outerShdw>
+          </a:effectLst>
+          <a:scene3d>
+            <a:camera prst="orthographicFront">
+              <a:rot lat="0" lon="0" rev="0"/>
+            </a:camera>
+            <a:lightRig rig="threePt" dir="t">
+              <a:rot lat="0" lon="0" rev="1200000"/>
+            </a:lightRig>
+          </a:scene3d>
+          <a:sp3d>
+            <a:bevelT w="63500" h="25400"/>
+          </a:sp3d>
+        </a:effectStyle>
+      </a:effectStyleLst>
+      <a:bgFillStyleLst>
+        <a:solidFill>
+          <a:schemeClr val="phClr"/>
+        </a:solidFill>
+        <a:gradFill rotWithShape="1">
+          <a:gsLst>
+            <a:gs pos="0">
+              <a:schemeClr val="phClr">
+                <a:tint val="40000"/>
+                <a:satMod val="350000"/>
+              </a:schemeClr>
+            </a:gs>
+            <a:gs pos="40000">
+              <a:schemeClr val="phClr">
+                <a:tint val="45000"/>
+                <a:shade val="99000"/>
+                <a:satMod val="350000"/>
+              </a:schemeClr>
+            </a:gs>
+            <a:gs pos="100000">
+              <a:schemeClr val="phClr">
+                <a:shade val="20000"/>
+                <a:satMod val="255000"/>
+              </a:schemeClr>
+            </a:gs>
+          </a:gsLst>
+          <a:path path="circle">
+            <a:fillToRect l="50000" t="-80000" r="50000" b="180000"/>
+          </a:path>
+        </a:gradFill>
+        <a:gradFill rotWithShape="1">
+          <a:gsLst>
+            <a:gs pos="0">
+              <a:schemeClr val="phClr">
+                <a:tint val="80000"/>
+                <a:satMod val="300000"/>
+              </a:schemeClr>
+            </a:gs>
+            <a:gs pos="100000">
+              <a:schemeClr val="phClr">
+                <a:shade val="30000"/>
+                <a:satMod val="200000"/>
+              </a:schemeClr>
+            </a:gs>
+          </a:gsLst>
+          <a:path path="circle">
+            <a:fillToRect l="50000" t="50000" r="50000" b="50000"/>
+          </a:path>
+        </a:gradFill>
+      </a:bgFillStyleLst>
+    </a:fmtScheme>
+  </a:themeElements>
+</a:theme>
+</file>
+
+<file path=ppt/theme/theme2.xml><?xml version="1.0" encoding="utf-8"?>
 <a:theme xmlns:a="http://schemas.openxmlformats.org/drawingml/2006/main" xmlns:r="http://schemas.openxmlformats.org/officeDocument/2006/relationships">
   <a:themeElements>
     <a:clrScheme name="Default">
@@ -12718,283 +13311,4 @@
     </a:fmtScheme>
   </a:themeElements>
 </a:theme>
-</file>
-
-<file path=ppt/theme/theme2.xml><?xml version="1.0" encoding="utf-8"?>
-<a:theme xmlns:a="http://schemas.openxmlformats.org/drawingml/2006/main" xmlns:r="http://schemas.openxmlformats.org/officeDocument/2006/relationships" name="Luxe">
-  <a:themeElements>
-    <a:clrScheme name="Luxe">
-      <a:dk1>
-        <a:srgbClr val="000000"/>
-      </a:dk1>
-      <a:lt1>
-        <a:srgbClr val="FFFFFF"/>
-      </a:lt1>
-      <a:dk2>
-        <a:srgbClr val="B7B7B7"/>
-      </a:dk2>
-      <a:lt2>
-        <a:srgbClr val="CCA677"/>
-      </a:lt2>
-      <a:accent1>
-        <a:srgbClr val="5D4037"/>
-      </a:accent1>
-      <a:accent2>
-        <a:srgbClr val="455A64"/>
-      </a:accent2>
-      <a:accent3>
-        <a:srgbClr val="57BB8A"/>
-      </a:accent3>
-      <a:accent4>
-        <a:srgbClr val="78909C"/>
-      </a:accent4>
-      <a:accent5>
-        <a:srgbClr val="607D8B"/>
-      </a:accent5>
-      <a:accent6>
-        <a:srgbClr val="DCE755"/>
-      </a:accent6>
-      <a:hlink>
-        <a:srgbClr val="607D8B"/>
-      </a:hlink>
-      <a:folHlink>
-        <a:srgbClr val="607D8B"/>
-      </a:folHlink>
-    </a:clrScheme>
-    <a:fontScheme name="Office">
-      <a:majorFont>
-        <a:latin typeface="Arial"/>
-        <a:ea typeface=""/>
-        <a:cs typeface=""/>
-        <a:font script="Jpan" typeface="ＭＳ Ｐゴシック"/>
-        <a:font script="Hang" typeface="맑은 고딕"/>
-        <a:font script="Hans" typeface="宋体"/>
-        <a:font script="Hant" typeface="新細明體"/>
-        <a:font script="Arab" typeface="Times New Roman"/>
-        <a:font script="Hebr" typeface="Times New Roman"/>
-        <a:font script="Thai" typeface="Angsana New"/>
-        <a:font script="Ethi" typeface="Nyala"/>
-        <a:font script="Beng" typeface="Vrinda"/>
-        <a:font script="Gujr" typeface="Shruti"/>
-        <a:font script="Khmr" typeface="MoolBoran"/>
-        <a:font script="Knda" typeface="Tunga"/>
-        <a:font script="Guru" typeface="Raavi"/>
-        <a:font script="Cans" typeface="Euphemia"/>
-        <a:font script="Cher" typeface="Plantagenet Cherokee"/>
-        <a:font script="Yiii" typeface="Microsoft Yi Baiti"/>
-        <a:font script="Tibt" typeface="Microsoft Himalaya"/>
-        <a:font script="Thaa" typeface="MV Boli"/>
-        <a:font script="Deva" typeface="Mangal"/>
-        <a:font script="Telu" typeface="Gautami"/>
-        <a:font script="Taml" typeface="Latha"/>
-        <a:font script="Syrc" typeface="Estrangelo Edessa"/>
-        <a:font script="Orya" typeface="Kalinga"/>
-        <a:font script="Mlym" typeface="Kartika"/>
-        <a:font script="Laoo" typeface="DokChampa"/>
-        <a:font script="Sinh" typeface="Iskoola Pota"/>
-        <a:font script="Mong" typeface="Mongolian Baiti"/>
-        <a:font script="Viet" typeface="Times New Roman"/>
-        <a:font script="Uigh" typeface="Microsoft Uighur"/>
-        <a:font script="Geor" typeface="Sylfaen"/>
-      </a:majorFont>
-      <a:minorFont>
-        <a:latin typeface="Arial"/>
-        <a:ea typeface=""/>
-        <a:cs typeface=""/>
-        <a:font script="Jpan" typeface="ＭＳ Ｐゴシック"/>
-        <a:font script="Hang" typeface="맑은 고딕"/>
-        <a:font script="Hans" typeface="宋体"/>
-        <a:font script="Hant" typeface="新細明體"/>
-        <a:font script="Arab" typeface="Arial"/>
-        <a:font script="Hebr" typeface="Arial"/>
-        <a:font script="Thai" typeface="Cordia New"/>
-        <a:font script="Ethi" typeface="Nyala"/>
-        <a:font script="Beng" typeface="Vrinda"/>
-        <a:font script="Gujr" typeface="Shruti"/>
-        <a:font script="Khmr" typeface="DaunPenh"/>
-        <a:font script="Knda" typeface="Tunga"/>
-        <a:font script="Guru" typeface="Raavi"/>
-        <a:font script="Cans" typeface="Euphemia"/>
-        <a:font script="Cher" typeface="Plantagenet Cherokee"/>
-        <a:font script="Yiii" typeface="Microsoft Yi Baiti"/>
-        <a:font script="Tibt" typeface="Microsoft Himalaya"/>
-        <a:font script="Thaa" typeface="MV Boli"/>
-        <a:font script="Deva" typeface="Mangal"/>
-        <a:font script="Telu" typeface="Gautami"/>
-        <a:font script="Taml" typeface="Latha"/>
-        <a:font script="Syrc" typeface="Estrangelo Edessa"/>
-        <a:font script="Orya" typeface="Kalinga"/>
-        <a:font script="Mlym" typeface="Kartika"/>
-        <a:font script="Laoo" typeface="DokChampa"/>
-        <a:font script="Sinh" typeface="Iskoola Pota"/>
-        <a:font script="Mong" typeface="Mongolian Baiti"/>
-        <a:font script="Viet" typeface="Arial"/>
-        <a:font script="Uigh" typeface="Microsoft Uighur"/>
-        <a:font script="Geor" typeface="Sylfaen"/>
-      </a:minorFont>
-    </a:fontScheme>
-    <a:fmtScheme name="Office">
-      <a:fillStyleLst>
-        <a:solidFill>
-          <a:schemeClr val="phClr"/>
-        </a:solidFill>
-        <a:gradFill rotWithShape="1">
-          <a:gsLst>
-            <a:gs pos="0">
-              <a:schemeClr val="phClr">
-                <a:tint val="50000"/>
-                <a:satMod val="300000"/>
-              </a:schemeClr>
-            </a:gs>
-            <a:gs pos="35000">
-              <a:schemeClr val="phClr">
-                <a:tint val="37000"/>
-                <a:satMod val="300000"/>
-              </a:schemeClr>
-            </a:gs>
-            <a:gs pos="100000">
-              <a:schemeClr val="phClr">
-                <a:tint val="15000"/>
-                <a:satMod val="350000"/>
-              </a:schemeClr>
-            </a:gs>
-          </a:gsLst>
-          <a:lin ang="16200000" scaled="1"/>
-        </a:gradFill>
-        <a:gradFill rotWithShape="1">
-          <a:gsLst>
-            <a:gs pos="0">
-              <a:schemeClr val="phClr">
-                <a:tint val="100000"/>
-                <a:shade val="100000"/>
-                <a:satMod val="130000"/>
-              </a:schemeClr>
-            </a:gs>
-            <a:gs pos="100000">
-              <a:schemeClr val="phClr">
-                <a:tint val="50000"/>
-                <a:shade val="100000"/>
-                <a:satMod val="350000"/>
-              </a:schemeClr>
-            </a:gs>
-          </a:gsLst>
-          <a:lin ang="16200000" scaled="0"/>
-        </a:gradFill>
-      </a:fillStyleLst>
-      <a:lnStyleLst>
-        <a:ln w="9525" cap="flat" cmpd="sng" algn="ctr">
-          <a:solidFill>
-            <a:schemeClr val="phClr">
-              <a:shade val="95000"/>
-              <a:satMod val="105000"/>
-            </a:schemeClr>
-          </a:solidFill>
-          <a:prstDash val="solid"/>
-        </a:ln>
-        <a:ln w="25400" cap="flat" cmpd="sng" algn="ctr">
-          <a:solidFill>
-            <a:schemeClr val="phClr"/>
-          </a:solidFill>
-          <a:prstDash val="solid"/>
-        </a:ln>
-        <a:ln w="38100" cap="flat" cmpd="sng" algn="ctr">
-          <a:solidFill>
-            <a:schemeClr val="phClr"/>
-          </a:solidFill>
-          <a:prstDash val="solid"/>
-        </a:ln>
-      </a:lnStyleLst>
-      <a:effectStyleLst>
-        <a:effectStyle>
-          <a:effectLst>
-            <a:outerShdw blurRad="40000" dist="20000" dir="5400000" rotWithShape="0">
-              <a:srgbClr val="000000">
-                <a:alpha val="38000"/>
-              </a:srgbClr>
-            </a:outerShdw>
-          </a:effectLst>
-        </a:effectStyle>
-        <a:effectStyle>
-          <a:effectLst>
-            <a:outerShdw blurRad="40000" dist="23000" dir="5400000" rotWithShape="0">
-              <a:srgbClr val="000000">
-                <a:alpha val="35000"/>
-              </a:srgbClr>
-            </a:outerShdw>
-          </a:effectLst>
-        </a:effectStyle>
-        <a:effectStyle>
-          <a:effectLst>
-            <a:outerShdw blurRad="40000" dist="23000" dir="5400000" rotWithShape="0">
-              <a:srgbClr val="000000">
-                <a:alpha val="35000"/>
-              </a:srgbClr>
-            </a:outerShdw>
-          </a:effectLst>
-          <a:scene3d>
-            <a:camera prst="orthographicFront">
-              <a:rot lat="0" lon="0" rev="0"/>
-            </a:camera>
-            <a:lightRig rig="threePt" dir="t">
-              <a:rot lat="0" lon="0" rev="1200000"/>
-            </a:lightRig>
-          </a:scene3d>
-          <a:sp3d>
-            <a:bevelT w="63500" h="25400"/>
-          </a:sp3d>
-        </a:effectStyle>
-      </a:effectStyleLst>
-      <a:bgFillStyleLst>
-        <a:solidFill>
-          <a:schemeClr val="phClr"/>
-        </a:solidFill>
-        <a:gradFill rotWithShape="1">
-          <a:gsLst>
-            <a:gs pos="0">
-              <a:schemeClr val="phClr">
-                <a:tint val="40000"/>
-                <a:satMod val="350000"/>
-              </a:schemeClr>
-            </a:gs>
-            <a:gs pos="40000">
-              <a:schemeClr val="phClr">
-                <a:tint val="45000"/>
-                <a:shade val="99000"/>
-                <a:satMod val="350000"/>
-              </a:schemeClr>
-            </a:gs>
-            <a:gs pos="100000">
-              <a:schemeClr val="phClr">
-                <a:shade val="20000"/>
-                <a:satMod val="255000"/>
-              </a:schemeClr>
-            </a:gs>
-          </a:gsLst>
-          <a:path path="circle">
-            <a:fillToRect l="50000" t="-80000" r="50000" b="180000"/>
-          </a:path>
-        </a:gradFill>
-        <a:gradFill rotWithShape="1">
-          <a:gsLst>
-            <a:gs pos="0">
-              <a:schemeClr val="phClr">
-                <a:tint val="80000"/>
-                <a:satMod val="300000"/>
-              </a:schemeClr>
-            </a:gs>
-            <a:gs pos="100000">
-              <a:schemeClr val="phClr">
-                <a:shade val="30000"/>
-                <a:satMod val="200000"/>
-              </a:schemeClr>
-            </a:gs>
-          </a:gsLst>
-          <a:path path="circle">
-            <a:fillToRect l="50000" t="50000" r="50000" b="50000"/>
-          </a:path>
-        </a:gradFill>
-      </a:bgFillStyleLst>
-    </a:fmtScheme>
-  </a:themeElements>
-</a:theme>
 </file>
</xml_diff>